<commit_message>
Added a ballistic round based on the missile code, added new icon. Added terrain avoidance - seems to work well.
</commit_message>
<xml_diff>
--- a/assets/display/icons/icons [Autosaved].pptx
+++ b/assets/display/icons/icons [Autosaved].pptx
@@ -6,10 +6,11 @@
   </p:sldMasterIdLst>
   <p:sldIdLst>
     <p:sldId id="256" r:id="rId2"/>
-    <p:sldId id="257" r:id="rId3"/>
-    <p:sldId id="260" r:id="rId4"/>
-    <p:sldId id="259" r:id="rId5"/>
-    <p:sldId id="261" r:id="rId6"/>
+    <p:sldId id="262" r:id="rId3"/>
+    <p:sldId id="257" r:id="rId4"/>
+    <p:sldId id="260" r:id="rId5"/>
+    <p:sldId id="259" r:id="rId6"/>
+    <p:sldId id="261" r:id="rId7"/>
   </p:sldIdLst>
   <p:sldSz cx="1800225" cy="1800225"/>
   <p:notesSz cx="6858000" cy="9144000"/>
@@ -247,7 +248,7 @@
           <a:p>
             <a:fld id="{83B0DD9A-6AEE-4CA7-A9F6-A1A12CF444F7}" type="datetimeFigureOut">
               <a:rPr lang="en-AU" smtClean="0"/>
-              <a:t>12/02/2022</a:t>
+              <a:t>22/05/2022</a:t>
             </a:fld>
             <a:endParaRPr lang="en-AU"/>
           </a:p>
@@ -417,7 +418,7 @@
           <a:p>
             <a:fld id="{83B0DD9A-6AEE-4CA7-A9F6-A1A12CF444F7}" type="datetimeFigureOut">
               <a:rPr lang="en-AU" smtClean="0"/>
-              <a:t>12/02/2022</a:t>
+              <a:t>22/05/2022</a:t>
             </a:fld>
             <a:endParaRPr lang="en-AU"/>
           </a:p>
@@ -597,7 +598,7 @@
           <a:p>
             <a:fld id="{83B0DD9A-6AEE-4CA7-A9F6-A1A12CF444F7}" type="datetimeFigureOut">
               <a:rPr lang="en-AU" smtClean="0"/>
-              <a:t>12/02/2022</a:t>
+              <a:t>22/05/2022</a:t>
             </a:fld>
             <a:endParaRPr lang="en-AU"/>
           </a:p>
@@ -767,7 +768,7 @@
           <a:p>
             <a:fld id="{83B0DD9A-6AEE-4CA7-A9F6-A1A12CF444F7}" type="datetimeFigureOut">
               <a:rPr lang="en-AU" smtClean="0"/>
-              <a:t>12/02/2022</a:t>
+              <a:t>22/05/2022</a:t>
             </a:fld>
             <a:endParaRPr lang="en-AU"/>
           </a:p>
@@ -1011,7 +1012,7 @@
           <a:p>
             <a:fld id="{83B0DD9A-6AEE-4CA7-A9F6-A1A12CF444F7}" type="datetimeFigureOut">
               <a:rPr lang="en-AU" smtClean="0"/>
-              <a:t>12/02/2022</a:t>
+              <a:t>22/05/2022</a:t>
             </a:fld>
             <a:endParaRPr lang="en-AU"/>
           </a:p>
@@ -1243,7 +1244,7 @@
           <a:p>
             <a:fld id="{83B0DD9A-6AEE-4CA7-A9F6-A1A12CF444F7}" type="datetimeFigureOut">
               <a:rPr lang="en-AU" smtClean="0"/>
-              <a:t>12/02/2022</a:t>
+              <a:t>22/05/2022</a:t>
             </a:fld>
             <a:endParaRPr lang="en-AU"/>
           </a:p>
@@ -1610,7 +1611,7 @@
           <a:p>
             <a:fld id="{83B0DD9A-6AEE-4CA7-A9F6-A1A12CF444F7}" type="datetimeFigureOut">
               <a:rPr lang="en-AU" smtClean="0"/>
-              <a:t>12/02/2022</a:t>
+              <a:t>22/05/2022</a:t>
             </a:fld>
             <a:endParaRPr lang="en-AU"/>
           </a:p>
@@ -1728,7 +1729,7 @@
           <a:p>
             <a:fld id="{83B0DD9A-6AEE-4CA7-A9F6-A1A12CF444F7}" type="datetimeFigureOut">
               <a:rPr lang="en-AU" smtClean="0"/>
-              <a:t>12/02/2022</a:t>
+              <a:t>22/05/2022</a:t>
             </a:fld>
             <a:endParaRPr lang="en-AU"/>
           </a:p>
@@ -1823,7 +1824,7 @@
           <a:p>
             <a:fld id="{83B0DD9A-6AEE-4CA7-A9F6-A1A12CF444F7}" type="datetimeFigureOut">
               <a:rPr lang="en-AU" smtClean="0"/>
-              <a:t>12/02/2022</a:t>
+              <a:t>22/05/2022</a:t>
             </a:fld>
             <a:endParaRPr lang="en-AU"/>
           </a:p>
@@ -2100,7 +2101,7 @@
           <a:p>
             <a:fld id="{83B0DD9A-6AEE-4CA7-A9F6-A1A12CF444F7}" type="datetimeFigureOut">
               <a:rPr lang="en-AU" smtClean="0"/>
-              <a:t>12/02/2022</a:t>
+              <a:t>22/05/2022</a:t>
             </a:fld>
             <a:endParaRPr lang="en-AU"/>
           </a:p>
@@ -2357,7 +2358,7 @@
           <a:p>
             <a:fld id="{83B0DD9A-6AEE-4CA7-A9F6-A1A12CF444F7}" type="datetimeFigureOut">
               <a:rPr lang="en-AU" smtClean="0"/>
-              <a:t>12/02/2022</a:t>
+              <a:t>22/05/2022</a:t>
             </a:fld>
             <a:endParaRPr lang="en-AU"/>
           </a:p>
@@ -2570,7 +2571,7 @@
           <a:p>
             <a:fld id="{83B0DD9A-6AEE-4CA7-A9F6-A1A12CF444F7}" type="datetimeFigureOut">
               <a:rPr lang="en-AU" smtClean="0"/>
-              <a:t>12/02/2022</a:t>
+              <a:t>22/05/2022</a:t>
             </a:fld>
             <a:endParaRPr lang="en-AU"/>
           </a:p>
@@ -3314,6 +3315,343 @@
       </p:grpSpPr>
       <p:grpSp>
         <p:nvGrpSpPr>
+          <p:cNvPr id="9" name="Group 8">
+            <a:extLst>
+              <a:ext uri="{FF2B5EF4-FFF2-40B4-BE49-F238E27FC236}">
+                <a16:creationId xmlns:a16="http://schemas.microsoft.com/office/drawing/2014/main" id="{393EA8FC-A438-4DAD-A577-E7AE83AB2F63}"/>
+              </a:ext>
+            </a:extLst>
+          </p:cNvPr>
+          <p:cNvGrpSpPr/>
+          <p:nvPr/>
+        </p:nvGrpSpPr>
+        <p:grpSpPr>
+          <a:xfrm rot="16200000">
+            <a:off x="153272" y="155435"/>
+            <a:ext cx="1491466" cy="1565258"/>
+            <a:chOff x="154379" y="154327"/>
+            <a:chExt cx="1491466" cy="1565258"/>
+          </a:xfrm>
+        </p:grpSpPr>
+        <p:sp>
+          <p:nvSpPr>
+            <p:cNvPr id="2" name="Rectangle 1">
+              <a:extLst>
+                <a:ext uri="{FF2B5EF4-FFF2-40B4-BE49-F238E27FC236}">
+                  <a16:creationId xmlns:a16="http://schemas.microsoft.com/office/drawing/2014/main" id="{EDA52ACA-6D24-4AED-89E1-130423820807}"/>
+                </a:ext>
+              </a:extLst>
+            </p:cNvPr>
+            <p:cNvSpPr/>
+            <p:nvPr/>
+          </p:nvSpPr>
+          <p:spPr>
+            <a:xfrm>
+              <a:off x="154379" y="154327"/>
+              <a:ext cx="1491466" cy="1491570"/>
+            </a:xfrm>
+            <a:prstGeom prst="rect">
+              <a:avLst/>
+            </a:prstGeom>
+            <a:solidFill>
+              <a:schemeClr val="tx1"/>
+            </a:solidFill>
+            <a:ln>
+              <a:noFill/>
+            </a:ln>
+            <a:effectLst>
+              <a:glow rad="254000">
+                <a:schemeClr val="bg1"/>
+              </a:glow>
+            </a:effectLst>
+          </p:spPr>
+          <p:style>
+            <a:lnRef idx="2">
+              <a:schemeClr val="accent1">
+                <a:shade val="50000"/>
+              </a:schemeClr>
+            </a:lnRef>
+            <a:fillRef idx="1">
+              <a:schemeClr val="accent1"/>
+            </a:fillRef>
+            <a:effectRef idx="0">
+              <a:schemeClr val="accent1"/>
+            </a:effectRef>
+            <a:fontRef idx="minor">
+              <a:schemeClr val="lt1"/>
+            </a:fontRef>
+          </p:style>
+          <p:txBody>
+            <a:bodyPr rtlCol="0" anchor="ctr"/>
+            <a:lstStyle/>
+            <a:p>
+              <a:pPr algn="ctr"/>
+              <a:endParaRPr lang="en-AU"/>
+            </a:p>
+          </p:txBody>
+        </p:sp>
+        <p:grpSp>
+          <p:nvGrpSpPr>
+            <p:cNvPr id="39" name="Group 38">
+              <a:extLst>
+                <a:ext uri="{FF2B5EF4-FFF2-40B4-BE49-F238E27FC236}">
+                  <a16:creationId xmlns:a16="http://schemas.microsoft.com/office/drawing/2014/main" id="{4F4DD76A-382E-46D9-A840-1AA73730AA44}"/>
+                </a:ext>
+              </a:extLst>
+            </p:cNvPr>
+            <p:cNvGrpSpPr/>
+            <p:nvPr/>
+          </p:nvGrpSpPr>
+          <p:grpSpPr>
+            <a:xfrm rot="2748745">
+              <a:off x="325113" y="608947"/>
+              <a:ext cx="1395502" cy="825774"/>
+              <a:chOff x="1863747" y="1600571"/>
+              <a:chExt cx="10185405" cy="4482572"/>
+            </a:xfrm>
+            <a:solidFill>
+              <a:schemeClr val="bg1"/>
+            </a:solidFill>
+            <a:effectLst/>
+          </p:grpSpPr>
+          <p:sp>
+            <p:nvSpPr>
+              <p:cNvPr id="4" name="Rectangle 3">
+                <a:extLst>
+                  <a:ext uri="{FF2B5EF4-FFF2-40B4-BE49-F238E27FC236}">
+                    <a16:creationId xmlns:a16="http://schemas.microsoft.com/office/drawing/2014/main" id="{ED4C6AF5-E0CD-4909-A091-D24C7B5ADFEC}"/>
+                  </a:ext>
+                </a:extLst>
+              </p:cNvPr>
+              <p:cNvSpPr/>
+              <p:nvPr/>
+            </p:nvSpPr>
+            <p:spPr>
+              <a:xfrm>
+                <a:off x="1863747" y="2661075"/>
+                <a:ext cx="7662334" cy="2396068"/>
+              </a:xfrm>
+              <a:prstGeom prst="rect">
+                <a:avLst/>
+              </a:prstGeom>
+              <a:grpFill/>
+              <a:ln>
+                <a:noFill/>
+              </a:ln>
+            </p:spPr>
+            <p:style>
+              <a:lnRef idx="2">
+                <a:schemeClr val="accent1">
+                  <a:shade val="50000"/>
+                </a:schemeClr>
+              </a:lnRef>
+              <a:fillRef idx="1">
+                <a:schemeClr val="accent1"/>
+              </a:fillRef>
+              <a:effectRef idx="0">
+                <a:schemeClr val="accent1"/>
+              </a:effectRef>
+              <a:fontRef idx="minor">
+                <a:schemeClr val="lt1"/>
+              </a:fontRef>
+            </p:style>
+            <p:txBody>
+              <a:bodyPr rtlCol="0" anchor="ctr"/>
+              <a:lstStyle/>
+              <a:p>
+                <a:pPr algn="ctr"/>
+                <a:endParaRPr lang="en-AU" sz="100"/>
+              </a:p>
+            </p:txBody>
+          </p:sp>
+          <p:sp>
+            <p:nvSpPr>
+              <p:cNvPr id="5" name="Isosceles Triangle 4">
+                <a:extLst>
+                  <a:ext uri="{FF2B5EF4-FFF2-40B4-BE49-F238E27FC236}">
+                    <a16:creationId xmlns:a16="http://schemas.microsoft.com/office/drawing/2014/main" id="{6DBC495A-5066-41BB-9D6B-19616BA35479}"/>
+                  </a:ext>
+                </a:extLst>
+              </p:cNvPr>
+              <p:cNvSpPr/>
+              <p:nvPr/>
+            </p:nvSpPr>
+            <p:spPr>
+              <a:xfrm rot="5400000">
+                <a:off x="9801253" y="2809245"/>
+                <a:ext cx="2396068" cy="2099731"/>
+              </a:xfrm>
+              <a:prstGeom prst="triangle">
+                <a:avLst/>
+              </a:prstGeom>
+              <a:grpFill/>
+              <a:ln>
+                <a:noFill/>
+              </a:ln>
+            </p:spPr>
+            <p:style>
+              <a:lnRef idx="2">
+                <a:schemeClr val="accent1">
+                  <a:shade val="50000"/>
+                </a:schemeClr>
+              </a:lnRef>
+              <a:fillRef idx="1">
+                <a:schemeClr val="accent1"/>
+              </a:fillRef>
+              <a:effectRef idx="0">
+                <a:schemeClr val="accent1"/>
+              </a:effectRef>
+              <a:fontRef idx="minor">
+                <a:schemeClr val="lt1"/>
+              </a:fontRef>
+            </p:style>
+            <p:txBody>
+              <a:bodyPr rtlCol="0" anchor="ctr"/>
+              <a:lstStyle/>
+              <a:p>
+                <a:pPr algn="ctr"/>
+                <a:endParaRPr lang="en-AU" sz="100"/>
+              </a:p>
+            </p:txBody>
+          </p:sp>
+          <p:sp>
+            <p:nvSpPr>
+              <p:cNvPr id="6" name="Isosceles Triangle 5">
+                <a:extLst>
+                  <a:ext uri="{FF2B5EF4-FFF2-40B4-BE49-F238E27FC236}">
+                    <a16:creationId xmlns:a16="http://schemas.microsoft.com/office/drawing/2014/main" id="{50049509-024F-43EA-A614-2C31B6803B8F}"/>
+                  </a:ext>
+                </a:extLst>
+              </p:cNvPr>
+              <p:cNvSpPr/>
+              <p:nvPr/>
+            </p:nvSpPr>
+            <p:spPr>
+              <a:xfrm>
+                <a:off x="3125280" y="1600571"/>
+                <a:ext cx="2396067" cy="1060510"/>
+              </a:xfrm>
+              <a:prstGeom prst="triangle">
+                <a:avLst>
+                  <a:gd name="adj" fmla="val 5040"/>
+                </a:avLst>
+              </a:prstGeom>
+              <a:grpFill/>
+              <a:ln>
+                <a:noFill/>
+              </a:ln>
+            </p:spPr>
+            <p:style>
+              <a:lnRef idx="2">
+                <a:schemeClr val="accent1">
+                  <a:shade val="50000"/>
+                </a:schemeClr>
+              </a:lnRef>
+              <a:fillRef idx="1">
+                <a:schemeClr val="accent1"/>
+              </a:fillRef>
+              <a:effectRef idx="0">
+                <a:schemeClr val="accent1"/>
+              </a:effectRef>
+              <a:fontRef idx="minor">
+                <a:schemeClr val="lt1"/>
+              </a:fontRef>
+            </p:style>
+            <p:txBody>
+              <a:bodyPr rtlCol="0" anchor="ctr"/>
+              <a:lstStyle/>
+              <a:p>
+                <a:pPr algn="ctr"/>
+                <a:endParaRPr lang="en-AU" sz="100"/>
+              </a:p>
+            </p:txBody>
+          </p:sp>
+          <p:sp>
+            <p:nvSpPr>
+              <p:cNvPr id="7" name="Isosceles Triangle 6">
+                <a:extLst>
+                  <a:ext uri="{FF2B5EF4-FFF2-40B4-BE49-F238E27FC236}">
+                    <a16:creationId xmlns:a16="http://schemas.microsoft.com/office/drawing/2014/main" id="{09592E3D-F6C0-461B-8709-73F823E65EF4}"/>
+                  </a:ext>
+                </a:extLst>
+              </p:cNvPr>
+              <p:cNvSpPr/>
+              <p:nvPr/>
+            </p:nvSpPr>
+            <p:spPr>
+              <a:xfrm rot="10800000">
+                <a:off x="3125279" y="5057141"/>
+                <a:ext cx="2396067" cy="1026002"/>
+              </a:xfrm>
+              <a:prstGeom prst="triangle">
+                <a:avLst>
+                  <a:gd name="adj" fmla="val 100000"/>
+                </a:avLst>
+              </a:prstGeom>
+              <a:grpFill/>
+              <a:ln>
+                <a:noFill/>
+              </a:ln>
+            </p:spPr>
+            <p:style>
+              <a:lnRef idx="2">
+                <a:schemeClr val="accent1">
+                  <a:shade val="50000"/>
+                </a:schemeClr>
+              </a:lnRef>
+              <a:fillRef idx="1">
+                <a:schemeClr val="accent1"/>
+              </a:fillRef>
+              <a:effectRef idx="0">
+                <a:schemeClr val="accent1"/>
+              </a:effectRef>
+              <a:fontRef idx="minor">
+                <a:schemeClr val="lt1"/>
+              </a:fontRef>
+            </p:style>
+            <p:txBody>
+              <a:bodyPr rtlCol="0" anchor="ctr"/>
+              <a:lstStyle/>
+              <a:p>
+                <a:pPr algn="ctr"/>
+                <a:endParaRPr lang="en-AU" sz="100"/>
+              </a:p>
+            </p:txBody>
+          </p:sp>
+        </p:grpSp>
+      </p:grpSp>
+    </p:spTree>
+    <p:extLst>
+      <p:ext uri="{BB962C8B-B14F-4D97-AF65-F5344CB8AC3E}">
+        <p14:creationId xmlns:p14="http://schemas.microsoft.com/office/powerpoint/2010/main" val="1763755365"/>
+      </p:ext>
+    </p:extLst>
+  </p:cSld>
+  <p:clrMapOvr>
+    <a:masterClrMapping/>
+  </p:clrMapOvr>
+</p:sld>
+</file>
+
+<file path=ppt/slides/slide3.xml><?xml version="1.0" encoding="utf-8"?>
+<p:sld xmlns:a="http://schemas.openxmlformats.org/drawingml/2006/main" xmlns:r="http://schemas.openxmlformats.org/officeDocument/2006/relationships" xmlns:p="http://schemas.openxmlformats.org/presentationml/2006/main">
+  <p:cSld>
+    <p:spTree>
+      <p:nvGrpSpPr>
+        <p:cNvPr id="1" name=""/>
+        <p:cNvGrpSpPr/>
+        <p:nvPr/>
+      </p:nvGrpSpPr>
+      <p:grpSpPr>
+        <a:xfrm>
+          <a:off x="0" y="0"/>
+          <a:ext cx="0" cy="0"/>
+          <a:chOff x="0" y="0"/>
+          <a:chExt cx="0" cy="0"/>
+        </a:xfrm>
+      </p:grpSpPr>
+      <p:grpSp>
+        <p:nvGrpSpPr>
           <p:cNvPr id="2" name="Group 1">
             <a:extLst>
               <a:ext uri="{FF2B5EF4-FFF2-40B4-BE49-F238E27FC236}">
@@ -3528,7 +3866,7 @@
 </p:sld>
 </file>
 
-<file path=ppt/slides/slide3.xml><?xml version="1.0" encoding="utf-8"?>
+<file path=ppt/slides/slide4.xml><?xml version="1.0" encoding="utf-8"?>
 <p:sld xmlns:a="http://schemas.openxmlformats.org/drawingml/2006/main" xmlns:r="http://schemas.openxmlformats.org/officeDocument/2006/relationships" xmlns:p="http://schemas.openxmlformats.org/presentationml/2006/main">
   <p:cSld>
     <p:spTree>
@@ -3865,7 +4203,7 @@
 </p:sld>
 </file>
 
-<file path=ppt/slides/slide4.xml><?xml version="1.0" encoding="utf-8"?>
+<file path=ppt/slides/slide5.xml><?xml version="1.0" encoding="utf-8"?>
 <p:sld xmlns:a="http://schemas.openxmlformats.org/drawingml/2006/main" xmlns:r="http://schemas.openxmlformats.org/officeDocument/2006/relationships" xmlns:p="http://schemas.openxmlformats.org/presentationml/2006/main">
   <p:cSld>
     <p:spTree>
@@ -4040,7 +4378,7 @@
 </p:sld>
 </file>
 
-<file path=ppt/slides/slide5.xml><?xml version="1.0" encoding="utf-8"?>
+<file path=ppt/slides/slide6.xml><?xml version="1.0" encoding="utf-8"?>
 <p:sld xmlns:a="http://schemas.openxmlformats.org/drawingml/2006/main" xmlns:r="http://schemas.openxmlformats.org/officeDocument/2006/relationships" xmlns:p="http://schemas.openxmlformats.org/presentationml/2006/main">
   <p:cSld>
     <p:spTree>

</xml_diff>